<commit_message>
redesign with ben's gawd tier web design skills
</commit_message>
<xml_diff>
--- a/final/FinalPoster.pptx
+++ b/final/FinalPoster.pptx
@@ -3103,7 +3103,7 @@
         </p:nvSpPr>
         <p:spPr>
           <a:xfrm>
-            <a:off x="24289237" y="37392114"/>
+            <a:off x="23984538" y="37388393"/>
             <a:ext cx="4750018" cy="646331"/>
           </a:xfrm>
           <a:prstGeom prst="rect">
@@ -3135,12 +3135,14 @@
               </a:ext>
             </a:extLst>
           </p:cNvPr>
-          <p:cNvCxnSpPr/>
+          <p:cNvCxnSpPr>
+            <a:cxnSpLocks/>
+          </p:cNvCxnSpPr>
           <p:nvPr/>
         </p:nvCxnSpPr>
         <p:spPr>
           <a:xfrm>
-            <a:off x="457200" y="37392114"/>
+            <a:off x="457200" y="37293828"/>
             <a:ext cx="28194000" cy="0"/>
           </a:xfrm>
           <a:prstGeom prst="line">
@@ -3304,8 +3306,8 @@
         </p:blipFill>
         <p:spPr>
           <a:xfrm>
-            <a:off x="1429430" y="19202400"/>
-            <a:ext cx="10325100" cy="4368800"/>
+            <a:off x="1429429" y="14905767"/>
+            <a:ext cx="10879805" cy="4603509"/>
           </a:xfrm>
           <a:prstGeom prst="rect">
             <a:avLst/>
@@ -3329,7 +3331,7 @@
         </p:nvCxnSpPr>
         <p:spPr>
           <a:xfrm>
-            <a:off x="533400" y="12085341"/>
+            <a:off x="718457" y="11922714"/>
             <a:ext cx="28194000" cy="0"/>
           </a:xfrm>
           <a:prstGeom prst="line">
@@ -3366,12 +3368,18 @@
         </p:nvSpPr>
         <p:spPr>
           <a:xfrm>
-            <a:off x="1429430" y="4436519"/>
-            <a:ext cx="10325100" cy="1107996"/>
+            <a:off x="1429430" y="4436518"/>
+            <a:ext cx="10325098" cy="1107996"/>
           </a:xfrm>
           <a:prstGeom prst="rect">
             <a:avLst/>
           </a:prstGeom>
+          <a:solidFill>
+            <a:schemeClr val="accent6">
+              <a:lumMod val="40000"/>
+              <a:lumOff val="60000"/>
+            </a:schemeClr>
+          </a:solidFill>
         </p:spPr>
         <p:style>
           <a:lnRef idx="2">
@@ -3396,6 +3404,9 @@
             <a:pPr algn="ctr"/>
             <a:r>
               <a:rPr lang="en-US" sz="6600" dirty="0">
+                <a:solidFill>
+                  <a:schemeClr val="tx1"/>
+                </a:solidFill>
                 <a:latin typeface="Helvetica" pitchFamily="2" charset="0"/>
               </a:rPr>
               <a:t>Abstract</a:t>
@@ -3417,12 +3428,18 @@
         </p:nvSpPr>
         <p:spPr>
           <a:xfrm>
-            <a:off x="17506270" y="4436519"/>
-            <a:ext cx="10325100" cy="1107996"/>
+            <a:off x="12871938" y="4436518"/>
+            <a:ext cx="14959432" cy="1107996"/>
           </a:xfrm>
           <a:prstGeom prst="rect">
             <a:avLst/>
           </a:prstGeom>
+          <a:solidFill>
+            <a:schemeClr val="accent6">
+              <a:lumMod val="40000"/>
+              <a:lumOff val="60000"/>
+            </a:schemeClr>
+          </a:solidFill>
         </p:spPr>
         <p:style>
           <a:lnRef idx="2">
@@ -3468,12 +3485,18 @@
         </p:nvSpPr>
         <p:spPr>
           <a:xfrm>
-            <a:off x="1429429" y="13514078"/>
-            <a:ext cx="10325099" cy="1107996"/>
+            <a:off x="1429429" y="12375176"/>
+            <a:ext cx="14959433" cy="1107996"/>
           </a:xfrm>
           <a:prstGeom prst="rect">
             <a:avLst/>
           </a:prstGeom>
+          <a:solidFill>
+            <a:schemeClr val="accent6">
+              <a:lumMod val="40000"/>
+              <a:lumOff val="60000"/>
+            </a:schemeClr>
+          </a:solidFill>
         </p:spPr>
         <p:style>
           <a:lnRef idx="2">
@@ -3519,12 +3542,18 @@
         </p:nvSpPr>
         <p:spPr>
           <a:xfrm>
-            <a:off x="17506269" y="13514078"/>
+            <a:off x="17506269" y="12375176"/>
             <a:ext cx="10325099" cy="1107996"/>
           </a:xfrm>
           <a:prstGeom prst="rect">
             <a:avLst/>
           </a:prstGeom>
+          <a:solidFill>
+            <a:schemeClr val="accent6">
+              <a:lumMod val="40000"/>
+              <a:lumOff val="60000"/>
+            </a:schemeClr>
+          </a:solidFill>
         </p:spPr>
         <p:style>
           <a:lnRef idx="2">
@@ -3570,7 +3599,7 @@
         </p:nvCxnSpPr>
         <p:spPr>
           <a:xfrm>
-            <a:off x="533400" y="28522770"/>
+            <a:off x="533400" y="29437168"/>
             <a:ext cx="28194000" cy="0"/>
           </a:xfrm>
           <a:prstGeom prst="line">
@@ -3608,11 +3637,17 @@
         <p:spPr>
           <a:xfrm>
             <a:off x="1429429" y="29951506"/>
-            <a:ext cx="10325099" cy="1107996"/>
+            <a:ext cx="11442509" cy="1107984"/>
           </a:xfrm>
           <a:prstGeom prst="rect">
             <a:avLst/>
           </a:prstGeom>
+          <a:solidFill>
+            <a:schemeClr val="accent6">
+              <a:lumMod val="40000"/>
+              <a:lumOff val="60000"/>
+            </a:schemeClr>
+          </a:solidFill>
         </p:spPr>
         <p:style>
           <a:lnRef idx="2">
@@ -3658,12 +3693,18 @@
         </p:nvSpPr>
         <p:spPr>
           <a:xfrm>
-            <a:off x="17506269" y="29951506"/>
-            <a:ext cx="10325099" cy="1107996"/>
+            <a:off x="16388859" y="29951506"/>
+            <a:ext cx="11442509" cy="1107972"/>
           </a:xfrm>
           <a:prstGeom prst="rect">
             <a:avLst/>
           </a:prstGeom>
+          <a:solidFill>
+            <a:schemeClr val="accent6">
+              <a:lumMod val="40000"/>
+              <a:lumOff val="60000"/>
+            </a:schemeClr>
+          </a:solidFill>
         </p:spPr>
         <p:style>
           <a:lnRef idx="2">
@@ -3709,8 +3750,8 @@
         </p:nvSpPr>
         <p:spPr>
           <a:xfrm>
-            <a:off x="1429430" y="6578736"/>
-            <a:ext cx="10325100" cy="3970318"/>
+            <a:off x="1429429" y="6354220"/>
+            <a:ext cx="10325098" cy="5823454"/>
           </a:xfrm>
           <a:prstGeom prst="rect">
             <a:avLst/>
@@ -3723,6 +3764,11 @@
           </a:bodyPr>
           <a:lstStyle/>
           <a:p>
+            <a:pPr>
+              <a:lnSpc>
+                <a:spcPct val="150000"/>
+              </a:lnSpc>
+            </a:pPr>
             <a:r>
               <a:rPr lang="en-US" sz="3600" dirty="0"/>
               <a:t>Our project is a discrete Morse code communication set, programmed on two ATmega88PA development boards. Using our developed solution, two users are able communicate back and forth by tapping out Morse Code on a button, for transmission over Bluetooth to the LCD of their respective partner’s device. </a:t>

</xml_diff>

<commit_message>
Folders and poster idea
</commit_message>
<xml_diff>
--- a/final/FinalPoster.pptx
+++ b/final/FinalPoster.pptx
@@ -254,7 +254,7 @@
           <a:p>
             <a:fld id="{961919A2-32CB-B446-B282-2AF8B1483076}" type="datetimeFigureOut">
               <a:rPr lang="en-US" smtClean="0"/>
-              <a:t>4/30/19</a:t>
+              <a:t>4/30/2019</a:t>
             </a:fld>
             <a:endParaRPr lang="en-US"/>
           </a:p>
@@ -424,7 +424,7 @@
           <a:p>
             <a:fld id="{961919A2-32CB-B446-B282-2AF8B1483076}" type="datetimeFigureOut">
               <a:rPr lang="en-US" smtClean="0"/>
-              <a:t>4/30/19</a:t>
+              <a:t>4/30/2019</a:t>
             </a:fld>
             <a:endParaRPr lang="en-US"/>
           </a:p>
@@ -604,7 +604,7 @@
           <a:p>
             <a:fld id="{961919A2-32CB-B446-B282-2AF8B1483076}" type="datetimeFigureOut">
               <a:rPr lang="en-US" smtClean="0"/>
-              <a:t>4/30/19</a:t>
+              <a:t>4/30/2019</a:t>
             </a:fld>
             <a:endParaRPr lang="en-US"/>
           </a:p>
@@ -774,7 +774,7 @@
           <a:p>
             <a:fld id="{961919A2-32CB-B446-B282-2AF8B1483076}" type="datetimeFigureOut">
               <a:rPr lang="en-US" smtClean="0"/>
-              <a:t>4/30/19</a:t>
+              <a:t>4/30/2019</a:t>
             </a:fld>
             <a:endParaRPr lang="en-US"/>
           </a:p>
@@ -1018,7 +1018,7 @@
           <a:p>
             <a:fld id="{961919A2-32CB-B446-B282-2AF8B1483076}" type="datetimeFigureOut">
               <a:rPr lang="en-US" smtClean="0"/>
-              <a:t>4/30/19</a:t>
+              <a:t>4/30/2019</a:t>
             </a:fld>
             <a:endParaRPr lang="en-US"/>
           </a:p>
@@ -1250,7 +1250,7 @@
           <a:p>
             <a:fld id="{961919A2-32CB-B446-B282-2AF8B1483076}" type="datetimeFigureOut">
               <a:rPr lang="en-US" smtClean="0"/>
-              <a:t>4/30/19</a:t>
+              <a:t>4/30/2019</a:t>
             </a:fld>
             <a:endParaRPr lang="en-US"/>
           </a:p>
@@ -1617,7 +1617,7 @@
           <a:p>
             <a:fld id="{961919A2-32CB-B446-B282-2AF8B1483076}" type="datetimeFigureOut">
               <a:rPr lang="en-US" smtClean="0"/>
-              <a:t>4/30/19</a:t>
+              <a:t>4/30/2019</a:t>
             </a:fld>
             <a:endParaRPr lang="en-US"/>
           </a:p>
@@ -1735,7 +1735,7 @@
           <a:p>
             <a:fld id="{961919A2-32CB-B446-B282-2AF8B1483076}" type="datetimeFigureOut">
               <a:rPr lang="en-US" smtClean="0"/>
-              <a:t>4/30/19</a:t>
+              <a:t>4/30/2019</a:t>
             </a:fld>
             <a:endParaRPr lang="en-US"/>
           </a:p>
@@ -1830,7 +1830,7 @@
           <a:p>
             <a:fld id="{961919A2-32CB-B446-B282-2AF8B1483076}" type="datetimeFigureOut">
               <a:rPr lang="en-US" smtClean="0"/>
-              <a:t>4/30/19</a:t>
+              <a:t>4/30/2019</a:t>
             </a:fld>
             <a:endParaRPr lang="en-US"/>
           </a:p>
@@ -2107,7 +2107,7 @@
           <a:p>
             <a:fld id="{961919A2-32CB-B446-B282-2AF8B1483076}" type="datetimeFigureOut">
               <a:rPr lang="en-US" smtClean="0"/>
-              <a:t>4/30/19</a:t>
+              <a:t>4/30/2019</a:t>
             </a:fld>
             <a:endParaRPr lang="en-US"/>
           </a:p>
@@ -2364,7 +2364,7 @@
           <a:p>
             <a:fld id="{961919A2-32CB-B446-B282-2AF8B1483076}" type="datetimeFigureOut">
               <a:rPr lang="en-US" smtClean="0"/>
-              <a:t>4/30/19</a:t>
+              <a:t>4/30/2019</a:t>
             </a:fld>
             <a:endParaRPr lang="en-US"/>
           </a:p>
@@ -2577,7 +2577,7 @@
           <a:p>
             <a:fld id="{961919A2-32CB-B446-B282-2AF8B1483076}" type="datetimeFigureOut">
               <a:rPr lang="en-US" smtClean="0"/>
-              <a:t>4/30/19</a:t>
+              <a:t>4/30/2019</a:t>
             </a:fld>
             <a:endParaRPr lang="en-US"/>
           </a:p>
@@ -3306,7 +3306,7 @@
         </p:blipFill>
         <p:spPr>
           <a:xfrm>
-            <a:off x="1429429" y="14905767"/>
+            <a:off x="2590011" y="14133299"/>
             <a:ext cx="10879805" cy="4603509"/>
           </a:xfrm>
           <a:prstGeom prst="rect">
@@ -3486,7 +3486,7 @@
         <p:spPr>
           <a:xfrm>
             <a:off x="1429429" y="12375176"/>
-            <a:ext cx="14959433" cy="1107996"/>
+            <a:ext cx="13200971" cy="1107996"/>
           </a:xfrm>
           <a:prstGeom prst="rect">
             <a:avLst/>
@@ -3542,8 +3542,8 @@
         </p:nvSpPr>
         <p:spPr>
           <a:xfrm>
-            <a:off x="17506269" y="12375176"/>
-            <a:ext cx="10325099" cy="1107996"/>
+            <a:off x="15806057" y="12375176"/>
+            <a:ext cx="12025311" cy="1107996"/>
           </a:xfrm>
           <a:prstGeom prst="rect">
             <a:avLst/>
@@ -3599,7 +3599,7 @@
         </p:nvCxnSpPr>
         <p:spPr>
           <a:xfrm>
-            <a:off x="533400" y="29437168"/>
+            <a:off x="711759" y="26661312"/>
             <a:ext cx="28194000" cy="0"/>
           </a:xfrm>
           <a:prstGeom prst="line">
@@ -3636,7 +3636,7 @@
         </p:nvSpPr>
         <p:spPr>
           <a:xfrm>
-            <a:off x="1429429" y="29951506"/>
+            <a:off x="1429430" y="27407699"/>
             <a:ext cx="11442509" cy="1107984"/>
           </a:xfrm>
           <a:prstGeom prst="rect">
@@ -3693,7 +3693,7 @@
         </p:nvSpPr>
         <p:spPr>
           <a:xfrm>
-            <a:off x="16388859" y="29951506"/>
+            <a:off x="16388863" y="27407711"/>
             <a:ext cx="11442509" cy="1107972"/>
           </a:xfrm>
           <a:prstGeom prst="rect">
@@ -3750,7 +3750,7 @@
         </p:nvSpPr>
         <p:spPr>
           <a:xfrm>
-            <a:off x="1429429" y="6354220"/>
+            <a:off x="1429429" y="5749956"/>
             <a:ext cx="10325098" cy="5823454"/>
           </a:xfrm>
           <a:prstGeom prst="rect">
@@ -3773,6 +3773,92 @@
               <a:rPr lang="en-US" sz="3600" dirty="0"/>
               <a:t>Our project is a discrete Morse code communication set, programmed on two ATmega88PA development boards. Using our developed solution, two users are able communicate back and forth by tapping out Morse Code on a button, for transmission over Bluetooth to the LCD of their respective partner’s device. </a:t>
             </a:r>
+          </a:p>
+        </p:txBody>
+      </p:sp>
+      <p:pic>
+        <p:nvPicPr>
+          <p:cNvPr id="12" name="Picture 11">
+            <a:extLst>
+              <a:ext uri="{FF2B5EF4-FFF2-40B4-BE49-F238E27FC236}">
+                <a16:creationId xmlns:a16="http://schemas.microsoft.com/office/drawing/2014/main" id="{727CC94C-6EF3-431E-913B-43B9F0427752}"/>
+              </a:ext>
+            </a:extLst>
+          </p:cNvPr>
+          <p:cNvPicPr>
+            <a:picLocks noChangeAspect="1"/>
+          </p:cNvPicPr>
+          <p:nvPr/>
+        </p:nvPicPr>
+        <p:blipFill>
+          <a:blip r:embed="rId4"/>
+          <a:stretch>
+            <a:fillRect/>
+          </a:stretch>
+        </p:blipFill>
+        <p:spPr>
+          <a:xfrm>
+            <a:off x="16952497" y="23557241"/>
+            <a:ext cx="9732430" cy="2357673"/>
+          </a:xfrm>
+          <a:prstGeom prst="rect">
+            <a:avLst/>
+          </a:prstGeom>
+        </p:spPr>
+      </p:pic>
+      <p:sp>
+        <p:nvSpPr>
+          <p:cNvPr id="13" name="TextBox 12">
+            <a:extLst>
+              <a:ext uri="{FF2B5EF4-FFF2-40B4-BE49-F238E27FC236}">
+                <a16:creationId xmlns:a16="http://schemas.microsoft.com/office/drawing/2014/main" id="{AE31F041-017C-4480-873E-01B763D5375A}"/>
+              </a:ext>
+            </a:extLst>
+          </p:cNvPr>
+          <p:cNvSpPr txBox="1"/>
+          <p:nvPr/>
+        </p:nvSpPr>
+        <p:spPr>
+          <a:xfrm>
+            <a:off x="1429429" y="28911677"/>
+            <a:ext cx="11442508" cy="8316444"/>
+          </a:xfrm>
+          <a:prstGeom prst="rect">
+            <a:avLst/>
+          </a:prstGeom>
+          <a:noFill/>
+        </p:spPr>
+        <p:txBody>
+          <a:bodyPr wrap="square" rtlCol="0">
+            <a:spAutoFit/>
+          </a:bodyPr>
+          <a:lstStyle/>
+          <a:p>
+            <a:pPr>
+              <a:lnSpc>
+                <a:spcPct val="150000"/>
+              </a:lnSpc>
+            </a:pPr>
+            <a:r>
+              <a:rPr lang="en-US" sz="3600" dirty="0"/>
+              <a:t>Reflecting on final physical hardware design, our solution would be more marketable if it was contained in a compact form factor, as opposed to being left on the development board and tethered to an outlet power source. The components are small enough to be wired to one board, and using a battery to power them all would result in an entirely portable communication device. We’re interested in pursuing this further to learn about 3D prototype printing as well as board design resources like </a:t>
+            </a:r>
+            <a:r>
+              <a:rPr lang="en-US" sz="3600" dirty="0" err="1"/>
+              <a:t>OSHPark</a:t>
+            </a:r>
+            <a:r>
+              <a:rPr lang="en-US" sz="3600" dirty="0"/>
+              <a:t>.</a:t>
+            </a:r>
+          </a:p>
+          <a:p>
+            <a:pPr>
+              <a:lnSpc>
+                <a:spcPct val="150000"/>
+              </a:lnSpc>
+            </a:pPr>
+            <a:endParaRPr lang="en-US" sz="3600" dirty="0"/>
           </a:p>
         </p:txBody>
       </p:sp>

</xml_diff>